<commit_message>
Update de las presentaciones
</commit_message>
<xml_diff>
--- a/2) Introducción a Componentes React.pptx
+++ b/2) Introducción a Componentes React.pptx
@@ -14,6 +14,7 @@
     <p:sldId id="260" r:id="rId8"/>
     <p:sldId id="262" r:id="rId9"/>
     <p:sldId id="264" r:id="rId10"/>
+    <p:sldId id="267" r:id="rId11"/>
   </p:sldIdLst>
   <p:sldSz cx="12192000" cy="6858000"/>
   <p:notesSz cx="6858000" cy="9144000"/>
@@ -349,7 +350,7 @@
           <a:p>
             <a:fld id="{65F84CA3-B026-45EF-80A8-44FC945CC6C8}" type="datetimeFigureOut">
               <a:rPr lang="es-ES" smtClean="0"/>
-              <a:t>15/01/2020</a:t>
+              <a:t>11/03/2020</a:t>
             </a:fld>
             <a:endParaRPr lang="es-ES"/>
           </a:p>
@@ -683,7 +684,7 @@
           <a:p>
             <a:fld id="{65F84CA3-B026-45EF-80A8-44FC945CC6C8}" type="datetimeFigureOut">
               <a:rPr lang="es-ES" smtClean="0"/>
-              <a:t>15/01/2020</a:t>
+              <a:t>11/03/2020</a:t>
             </a:fld>
             <a:endParaRPr lang="es-ES"/>
           </a:p>
@@ -961,7 +962,7 @@
           <a:p>
             <a:fld id="{65F84CA3-B026-45EF-80A8-44FC945CC6C8}" type="datetimeFigureOut">
               <a:rPr lang="es-ES" smtClean="0"/>
-              <a:t>15/01/2020</a:t>
+              <a:t>11/03/2020</a:t>
             </a:fld>
             <a:endParaRPr lang="es-ES"/>
           </a:p>
@@ -1529,7 +1530,7 @@
           <a:p>
             <a:fld id="{65F84CA3-B026-45EF-80A8-44FC945CC6C8}" type="datetimeFigureOut">
               <a:rPr lang="es-ES" smtClean="0"/>
-              <a:t>15/01/2020</a:t>
+              <a:t>11/03/2020</a:t>
             </a:fld>
             <a:endParaRPr lang="es-ES"/>
           </a:p>
@@ -1807,7 +1808,7 @@
           <a:p>
             <a:fld id="{65F84CA3-B026-45EF-80A8-44FC945CC6C8}" type="datetimeFigureOut">
               <a:rPr lang="es-ES" smtClean="0"/>
-              <a:t>15/01/2020</a:t>
+              <a:t>11/03/2020</a:t>
             </a:fld>
             <a:endParaRPr lang="es-ES"/>
           </a:p>
@@ -2369,7 +2370,7 @@
           <a:p>
             <a:fld id="{65F84CA3-B026-45EF-80A8-44FC945CC6C8}" type="datetimeFigureOut">
               <a:rPr lang="es-ES" smtClean="0"/>
-              <a:t>15/01/2020</a:t>
+              <a:t>11/03/2020</a:t>
             </a:fld>
             <a:endParaRPr lang="es-ES"/>
           </a:p>
@@ -2696,7 +2697,7 @@
           <a:p>
             <a:fld id="{65F84CA3-B026-45EF-80A8-44FC945CC6C8}" type="datetimeFigureOut">
               <a:rPr lang="es-ES" smtClean="0"/>
-              <a:t>15/01/2020</a:t>
+              <a:t>11/03/2020</a:t>
             </a:fld>
             <a:endParaRPr lang="es-ES"/>
           </a:p>
@@ -2901,7 +2902,7 @@
           <a:p>
             <a:fld id="{65F84CA3-B026-45EF-80A8-44FC945CC6C8}" type="datetimeFigureOut">
               <a:rPr lang="es-ES" smtClean="0"/>
-              <a:t>15/01/2020</a:t>
+              <a:t>11/03/2020</a:t>
             </a:fld>
             <a:endParaRPr lang="es-ES"/>
           </a:p>
@@ -3111,7 +3112,7 @@
           <a:p>
             <a:fld id="{65F84CA3-B026-45EF-80A8-44FC945CC6C8}" type="datetimeFigureOut">
               <a:rPr lang="es-ES" smtClean="0"/>
-              <a:t>15/01/2020</a:t>
+              <a:t>11/03/2020</a:t>
             </a:fld>
             <a:endParaRPr lang="es-ES"/>
           </a:p>
@@ -3311,7 +3312,7 @@
           <a:p>
             <a:fld id="{65F84CA3-B026-45EF-80A8-44FC945CC6C8}" type="datetimeFigureOut">
               <a:rPr lang="es-ES" smtClean="0"/>
-              <a:t>15/01/2020</a:t>
+              <a:t>11/03/2020</a:t>
             </a:fld>
             <a:endParaRPr lang="es-ES"/>
           </a:p>
@@ -3587,7 +3588,7 @@
           <a:p>
             <a:fld id="{65F84CA3-B026-45EF-80A8-44FC945CC6C8}" type="datetimeFigureOut">
               <a:rPr lang="es-ES" smtClean="0"/>
-              <a:t>15/01/2020</a:t>
+              <a:t>11/03/2020</a:t>
             </a:fld>
             <a:endParaRPr lang="es-ES"/>
           </a:p>
@@ -3853,7 +3854,7 @@
           <a:p>
             <a:fld id="{65F84CA3-B026-45EF-80A8-44FC945CC6C8}" type="datetimeFigureOut">
               <a:rPr lang="es-ES" smtClean="0"/>
-              <a:t>15/01/2020</a:t>
+              <a:t>11/03/2020</a:t>
             </a:fld>
             <a:endParaRPr lang="es-ES"/>
           </a:p>
@@ -4227,7 +4228,7 @@
           <a:p>
             <a:fld id="{65F84CA3-B026-45EF-80A8-44FC945CC6C8}" type="datetimeFigureOut">
               <a:rPr lang="es-ES" smtClean="0"/>
-              <a:t>15/01/2020</a:t>
+              <a:t>11/03/2020</a:t>
             </a:fld>
             <a:endParaRPr lang="es-ES"/>
           </a:p>
@@ -4375,7 +4376,7 @@
           <a:p>
             <a:fld id="{65F84CA3-B026-45EF-80A8-44FC945CC6C8}" type="datetimeFigureOut">
               <a:rPr lang="es-ES" smtClean="0"/>
-              <a:t>15/01/2020</a:t>
+              <a:t>11/03/2020</a:t>
             </a:fld>
             <a:endParaRPr lang="es-ES"/>
           </a:p>
@@ -4500,7 +4501,7 @@
           <a:p>
             <a:fld id="{65F84CA3-B026-45EF-80A8-44FC945CC6C8}" type="datetimeFigureOut">
               <a:rPr lang="es-ES" smtClean="0"/>
-              <a:t>15/01/2020</a:t>
+              <a:t>11/03/2020</a:t>
             </a:fld>
             <a:endParaRPr lang="es-ES"/>
           </a:p>
@@ -4785,7 +4786,7 @@
           <a:p>
             <a:fld id="{65F84CA3-B026-45EF-80A8-44FC945CC6C8}" type="datetimeFigureOut">
               <a:rPr lang="es-ES" smtClean="0"/>
-              <a:t>15/01/2020</a:t>
+              <a:t>11/03/2020</a:t>
             </a:fld>
             <a:endParaRPr lang="es-ES"/>
           </a:p>
@@ -5109,7 +5110,7 @@
           <a:p>
             <a:fld id="{65F84CA3-B026-45EF-80A8-44FC945CC6C8}" type="datetimeFigureOut">
               <a:rPr lang="es-ES" smtClean="0"/>
-              <a:t>15/01/2020</a:t>
+              <a:t>11/03/2020</a:t>
             </a:fld>
             <a:endParaRPr lang="es-ES"/>
           </a:p>
@@ -5323,7 +5324,7 @@
           <a:p>
             <a:fld id="{65F84CA3-B026-45EF-80A8-44FC945CC6C8}" type="datetimeFigureOut">
               <a:rPr lang="es-ES" smtClean="0"/>
-              <a:t>15/01/2020</a:t>
+              <a:t>11/03/2020</a:t>
             </a:fld>
             <a:endParaRPr lang="es-ES"/>
           </a:p>
@@ -5917,6 +5918,220 @@
 </p:sld>
 </file>
 
+<file path=ppt/slides/slide10.xml><?xml version="1.0" encoding="utf-8"?>
+<p:sld xmlns:a="http://schemas.openxmlformats.org/drawingml/2006/main" xmlns:r="http://schemas.openxmlformats.org/officeDocument/2006/relationships" xmlns:p="http://schemas.openxmlformats.org/presentationml/2006/main">
+  <p:cSld>
+    <p:spTree>
+      <p:nvGrpSpPr>
+        <p:cNvPr id="1" name=""/>
+        <p:cNvGrpSpPr/>
+        <p:nvPr/>
+      </p:nvGrpSpPr>
+      <p:grpSpPr>
+        <a:xfrm>
+          <a:off x="0" y="0"/>
+          <a:ext cx="0" cy="0"/>
+          <a:chOff x="0" y="0"/>
+          <a:chExt cx="0" cy="0"/>
+        </a:xfrm>
+      </p:grpSpPr>
+      <p:sp>
+        <p:nvSpPr>
+          <p:cNvPr id="143" name="CustomShape 1"/>
+          <p:cNvSpPr/>
+          <p:nvPr/>
+        </p:nvSpPr>
+        <p:spPr>
+          <a:xfrm>
+            <a:off x="2153963" y="1963725"/>
+            <a:ext cx="8491222" cy="830997"/>
+          </a:xfrm>
+          <a:prstGeom prst="rect">
+            <a:avLst/>
+          </a:prstGeom>
+          <a:noFill/>
+          <a:ln>
+            <a:noFill/>
+          </a:ln>
+        </p:spPr>
+        <p:style>
+          <a:lnRef idx="0">
+            <a:scrgbClr r="0" g="0" b="0"/>
+          </a:lnRef>
+          <a:fillRef idx="0">
+            <a:scrgbClr r="0" g="0" b="0"/>
+          </a:fillRef>
+          <a:effectRef idx="0">
+            <a:scrgbClr r="0" g="0" b="0"/>
+          </a:effectRef>
+          <a:fontRef idx="minor"/>
+        </p:style>
+        <p:txBody>
+          <a:bodyPr lIns="0" tIns="0" rIns="0" bIns="0" anchor="ctr">
+            <a:spAutoFit/>
+          </a:bodyPr>
+          <a:lstStyle/>
+          <a:p>
+            <a:pPr algn="ctr">
+              <a:lnSpc>
+                <a:spcPct val="100000"/>
+              </a:lnSpc>
+            </a:pPr>
+            <a:r>
+              <a:rPr lang="es-CR" sz="5400" spc="-1" dirty="0">
+                <a:latin typeface="Arial"/>
+                <a:ea typeface="DejaVu Sans"/>
+              </a:rPr>
+              <a:t>Muchas gracias </a:t>
+            </a:r>
+            <a:endParaRPr lang="es-CR" sz="5400" spc="-1" dirty="0">
+              <a:latin typeface="Arial"/>
+            </a:endParaRPr>
+          </a:p>
+        </p:txBody>
+      </p:sp>
+      <p:sp>
+        <p:nvSpPr>
+          <p:cNvPr id="144" name="CustomShape 2"/>
+          <p:cNvSpPr/>
+          <p:nvPr/>
+        </p:nvSpPr>
+        <p:spPr>
+          <a:xfrm>
+            <a:off x="3748652" y="4222259"/>
+            <a:ext cx="5301844" cy="430887"/>
+          </a:xfrm>
+          <a:prstGeom prst="rect">
+            <a:avLst/>
+          </a:prstGeom>
+          <a:noFill/>
+          <a:ln>
+            <a:noFill/>
+          </a:ln>
+        </p:spPr>
+        <p:style>
+          <a:lnRef idx="0">
+            <a:scrgbClr r="0" g="0" b="0"/>
+          </a:lnRef>
+          <a:fillRef idx="0">
+            <a:scrgbClr r="0" g="0" b="0"/>
+          </a:fillRef>
+          <a:effectRef idx="0">
+            <a:scrgbClr r="0" g="0" b="0"/>
+          </a:effectRef>
+          <a:fontRef idx="minor"/>
+        </p:style>
+        <p:txBody>
+          <a:bodyPr wrap="square" lIns="0" tIns="0" rIns="0" bIns="0" anchor="ctr">
+            <a:spAutoFit/>
+          </a:bodyPr>
+          <a:lstStyle/>
+          <a:p>
+            <a:r>
+              <a:rPr lang="es-CR" sz="2800" spc="-1" dirty="0">
+                <a:latin typeface="Arial"/>
+                <a:ea typeface="DejaVu Sans"/>
+              </a:rPr>
+              <a:t>Vea el curso básico completo en</a:t>
+            </a:r>
+            <a:r>
+              <a:rPr lang="es-CR" sz="2400" spc="-1" dirty="0">
+                <a:latin typeface="Arial"/>
+                <a:ea typeface="DejaVu Sans"/>
+              </a:rPr>
+              <a:t>:</a:t>
+            </a:r>
+            <a:endParaRPr lang="es-CR" sz="2400" spc="-1" dirty="0">
+              <a:latin typeface="Arial"/>
+            </a:endParaRPr>
+          </a:p>
+        </p:txBody>
+      </p:sp>
+      <p:sp>
+        <p:nvSpPr>
+          <p:cNvPr id="145" name="TextShape 3"/>
+          <p:cNvSpPr txBox="1"/>
+          <p:nvPr/>
+        </p:nvSpPr>
+        <p:spPr>
+          <a:xfrm>
+            <a:off x="4101201" y="4665225"/>
+            <a:ext cx="4596746" cy="417471"/>
+          </a:xfrm>
+          <a:prstGeom prst="rect">
+            <a:avLst/>
+          </a:prstGeom>
+          <a:noFill/>
+          <a:ln>
+            <a:noFill/>
+          </a:ln>
+        </p:spPr>
+        <p:txBody>
+          <a:bodyPr wrap="square" lIns="81646" tIns="40823" rIns="81646" bIns="40823">
+            <a:spAutoFit/>
+          </a:bodyPr>
+          <a:lstStyle/>
+          <a:p>
+            <a:pPr>
+              <a:spcBef>
+                <a:spcPts val="1080"/>
+              </a:spcBef>
+              <a:spcAft>
+                <a:spcPts val="900"/>
+              </a:spcAft>
+              <a:buClr>
+                <a:srgbClr val="000000"/>
+              </a:buClr>
+              <a:buSzPct val="45000"/>
+            </a:pPr>
+            <a:r>
+              <a:rPr lang="es-CR" sz="2177" spc="-1" dirty="0">
+                <a:latin typeface="Arial"/>
+                <a:hlinkClick r:id="rId2"/>
+              </a:rPr>
+              <a:t>https://profesantiago.github.io/React</a:t>
+            </a:r>
+            <a:endParaRPr lang="es-CR" sz="2177" spc="-1" dirty="0">
+              <a:latin typeface="Arial"/>
+            </a:endParaRPr>
+          </a:p>
+        </p:txBody>
+      </p:sp>
+    </p:spTree>
+  </p:cSld>
+  <p:clrMapOvr>
+    <a:masterClrMapping/>
+  </p:clrMapOvr>
+  <p:timing>
+    <p:tnLst>
+      <p:par>
+        <p:cTn id="1" dur="indefinite" restart="never" nodeType="tmRoot">
+          <p:childTnLst>
+            <p:seq>
+              <p:cTn id="2" dur="indefinite" nodeType="mainSeq"/>
+              <p:prevCondLst>
+                <p:cond evt="onPrev" delay="0">
+                  <p:tgtEl>
+                    <p:sldTgt/>
+                  </p:tgtEl>
+                </p:cond>
+              </p:prevCondLst>
+              <p:nextCondLst>
+                <p:cond evt="onNext" delay="0">
+                  <p:tgtEl>
+                    <p:sldTgt/>
+                  </p:tgtEl>
+                </p:cond>
+              </p:nextCondLst>
+            </p:seq>
+          </p:childTnLst>
+        </p:cTn>
+      </p:par>
+    </p:tnLst>
+  </p:timing>
+</p:sld>
+</file>
+
 <file path=ppt/slides/slide2.xml><?xml version="1.0" encoding="utf-8"?>
 <p:sld xmlns:a="http://schemas.openxmlformats.org/drawingml/2006/main" xmlns:r="http://schemas.openxmlformats.org/officeDocument/2006/relationships" xmlns:p="http://schemas.openxmlformats.org/presentationml/2006/main">
   <p:cSld>

</xml_diff>